<commit_message>
Updated Veriablen und Verzweigungen.pptx
</commit_message>
<xml_diff>
--- a/Variablen und Verzweigungen.pptx
+++ b/Variablen und Verzweigungen.pptx
@@ -120,6 +120,9 @@
         </p14:section>
       </p14:sectionLst>
     </p:ext>
+    <p:ext uri="{EFAFB233-063F-42B5-8137-9DF3F51BA10A}">
+      <p15:sldGuideLst xmlns:p15="http://schemas.microsoft.com/office/powerpoint/2012/main"/>
+    </p:ext>
   </p:extLst>
 </p:presentation>
 </file>
@@ -459,7 +462,7 @@
           <a:p>
             <a:fld id="{C764DE79-268F-4C1A-8933-263129D2AF90}" type="datetimeFigureOut">
               <a:rPr lang="en-US" smtClean="0"/>
-              <a:t>9/8/2020</a:t>
+              <a:t>9/14/2020</a:t>
             </a:fld>
             <a:endParaRPr lang="en-US" dirty="0"/>
           </a:p>
@@ -1547,7 +1550,7 @@
           <a:p>
             <a:fld id="{C764DE79-268F-4C1A-8933-263129D2AF90}" type="datetimeFigureOut">
               <a:rPr lang="en-US" smtClean="0"/>
-              <a:t>9/8/2020</a:t>
+              <a:t>9/14/2020</a:t>
             </a:fld>
             <a:endParaRPr lang="en-US" dirty="0"/>
           </a:p>
@@ -2527,7 +2530,7 @@
           <a:p>
             <a:fld id="{C764DE79-268F-4C1A-8933-263129D2AF90}" type="datetimeFigureOut">
               <a:rPr lang="en-US" smtClean="0"/>
-              <a:t>9/8/2020</a:t>
+              <a:t>9/14/2020</a:t>
             </a:fld>
             <a:endParaRPr lang="en-US" dirty="0"/>
           </a:p>
@@ -3661,7 +3664,7 @@
           <a:p>
             <a:fld id="{C764DE79-268F-4C1A-8933-263129D2AF90}" type="datetimeFigureOut">
               <a:rPr lang="en-US" smtClean="0"/>
-              <a:t>9/8/2020</a:t>
+              <a:t>9/14/2020</a:t>
             </a:fld>
             <a:endParaRPr lang="en-US" dirty="0"/>
           </a:p>
@@ -4694,7 +4697,7 @@
           <a:p>
             <a:fld id="{C764DE79-268F-4C1A-8933-263129D2AF90}" type="datetimeFigureOut">
               <a:rPr lang="en-US" smtClean="0"/>
-              <a:t>9/8/2020</a:t>
+              <a:t>9/14/2020</a:t>
             </a:fld>
             <a:endParaRPr lang="en-US" dirty="0"/>
           </a:p>
@@ -5354,7 +5357,7 @@
           <a:p>
             <a:fld id="{C764DE79-268F-4C1A-8933-263129D2AF90}" type="datetimeFigureOut">
               <a:rPr lang="en-US" smtClean="0"/>
-              <a:t>9/8/2020</a:t>
+              <a:t>9/14/2020</a:t>
             </a:fld>
             <a:endParaRPr lang="en-US" dirty="0"/>
           </a:p>
@@ -6215,7 +6218,7 @@
           <a:p>
             <a:fld id="{C764DE79-268F-4C1A-8933-263129D2AF90}" type="datetimeFigureOut">
               <a:rPr lang="en-US" smtClean="0"/>
-              <a:t>9/8/2020</a:t>
+              <a:t>9/14/2020</a:t>
             </a:fld>
             <a:endParaRPr lang="en-US" dirty="0"/>
           </a:p>
@@ -6405,7 +6408,7 @@
           <a:p>
             <a:fld id="{C764DE79-268F-4C1A-8933-263129D2AF90}" type="datetimeFigureOut">
               <a:rPr lang="en-US" smtClean="0"/>
-              <a:t>9/8/2020</a:t>
+              <a:t>9/14/2020</a:t>
             </a:fld>
             <a:endParaRPr lang="en-US" dirty="0"/>
           </a:p>
@@ -7377,7 +7380,7 @@
           <a:p>
             <a:fld id="{C764DE79-268F-4C1A-8933-263129D2AF90}" type="datetimeFigureOut">
               <a:rPr lang="en-US" smtClean="0"/>
-              <a:t>9/8/2020</a:t>
+              <a:t>9/14/2020</a:t>
             </a:fld>
             <a:endParaRPr lang="en-US" dirty="0"/>
           </a:p>
@@ -7588,7 +7591,7 @@
           <a:p>
             <a:fld id="{C764DE79-268F-4C1A-8933-263129D2AF90}" type="datetimeFigureOut">
               <a:rPr lang="en-US" smtClean="0"/>
-              <a:t>9/8/2020</a:t>
+              <a:t>9/14/2020</a:t>
             </a:fld>
             <a:endParaRPr lang="en-US" dirty="0"/>
           </a:p>
@@ -8622,7 +8625,7 @@
           <a:p>
             <a:fld id="{C764DE79-268F-4C1A-8933-263129D2AF90}" type="datetimeFigureOut">
               <a:rPr lang="en-US" smtClean="0"/>
-              <a:t>9/8/2020</a:t>
+              <a:t>9/14/2020</a:t>
             </a:fld>
             <a:endParaRPr lang="en-US" dirty="0"/>
           </a:p>
@@ -8894,7 +8897,7 @@
           <a:p>
             <a:fld id="{C764DE79-268F-4C1A-8933-263129D2AF90}" type="datetimeFigureOut">
               <a:rPr lang="en-US" smtClean="0"/>
-              <a:t>9/8/2020</a:t>
+              <a:t>9/14/2020</a:t>
             </a:fld>
             <a:endParaRPr lang="en-US" dirty="0"/>
           </a:p>
@@ -9304,7 +9307,7 @@
           <a:p>
             <a:fld id="{C764DE79-268F-4C1A-8933-263129D2AF90}" type="datetimeFigureOut">
               <a:rPr lang="en-US" smtClean="0"/>
-              <a:t>9/8/2020</a:t>
+              <a:t>9/14/2020</a:t>
             </a:fld>
             <a:endParaRPr lang="en-US" dirty="0"/>
           </a:p>
@@ -9431,7 +9434,7 @@
           <a:p>
             <a:fld id="{C764DE79-268F-4C1A-8933-263129D2AF90}" type="datetimeFigureOut">
               <a:rPr lang="en-US" smtClean="0"/>
-              <a:t>9/8/2020</a:t>
+              <a:t>9/14/2020</a:t>
             </a:fld>
             <a:endParaRPr lang="en-US" dirty="0"/>
           </a:p>
@@ -9526,7 +9529,7 @@
           <a:p>
             <a:fld id="{C764DE79-268F-4C1A-8933-263129D2AF90}" type="datetimeFigureOut">
               <a:rPr lang="en-US" smtClean="0"/>
-              <a:t>9/8/2020</a:t>
+              <a:t>9/14/2020</a:t>
             </a:fld>
             <a:endParaRPr lang="en-US" dirty="0"/>
           </a:p>
@@ -10607,7 +10610,7 @@
           <a:p>
             <a:fld id="{C764DE79-268F-4C1A-8933-263129D2AF90}" type="datetimeFigureOut">
               <a:rPr lang="en-US" smtClean="0"/>
-              <a:t>9/8/2020</a:t>
+              <a:t>9/14/2020</a:t>
             </a:fld>
             <a:endParaRPr lang="en-US" dirty="0"/>
           </a:p>
@@ -11715,7 +11718,7 @@
           <a:p>
             <a:fld id="{C764DE79-268F-4C1A-8933-263129D2AF90}" type="datetimeFigureOut">
               <a:rPr lang="en-US" smtClean="0"/>
-              <a:t>9/8/2020</a:t>
+              <a:t>9/14/2020</a:t>
             </a:fld>
             <a:endParaRPr lang="en-US" dirty="0"/>
           </a:p>
@@ -12712,7 +12715,7 @@
           <a:p>
             <a:fld id="{C764DE79-268F-4C1A-8933-263129D2AF90}" type="datetimeFigureOut">
               <a:rPr lang="en-US" smtClean="0"/>
-              <a:t>9/8/2020</a:t>
+              <a:t>9/14/2020</a:t>
             </a:fld>
             <a:endParaRPr lang="en-US" dirty="0"/>
           </a:p>
@@ -13335,13 +13338,13 @@
   <p:clrMapOvr>
     <a:masterClrMapping/>
   </p:clrMapOvr>
-  <mc:AlternateContent xmlns:mc="http://schemas.openxmlformats.org/markup-compatibility/2006">
-    <mc:Choice xmlns:p14="http://schemas.microsoft.com/office/powerpoint/2010/main" Requires="p14">
+  <mc:AlternateContent xmlns:mc="http://schemas.openxmlformats.org/markup-compatibility/2006" xmlns:p14="http://schemas.microsoft.com/office/powerpoint/2010/main">
+    <mc:Choice Requires="p14">
       <p:transition spd="med" p14:dur="700">
         <p:fade/>
       </p:transition>
     </mc:Choice>
-    <mc:Fallback>
+    <mc:Fallback xmlns="">
       <p:transition spd="med">
         <p:fade/>
       </p:transition>
@@ -13442,13 +13445,13 @@
   <p:clrMapOvr>
     <a:masterClrMapping/>
   </p:clrMapOvr>
-  <mc:AlternateContent xmlns:mc="http://schemas.openxmlformats.org/markup-compatibility/2006">
-    <mc:Choice xmlns:p14="http://schemas.microsoft.com/office/powerpoint/2010/main" Requires="p14">
+  <mc:AlternateContent xmlns:mc="http://schemas.openxmlformats.org/markup-compatibility/2006" xmlns:p14="http://schemas.microsoft.com/office/powerpoint/2010/main">
+    <mc:Choice Requires="p14">
       <p:transition spd="med" p14:dur="700">
         <p:fade/>
       </p:transition>
     </mc:Choice>
-    <mc:Fallback>
+    <mc:Fallback xmlns="">
       <p:transition spd="med">
         <p:fade/>
       </p:transition>
@@ -13534,6 +13537,20 @@
             <a:r>
               <a:rPr lang="de-DE" dirty="0" smtClean="0"/>
               <a:t>Bedingungen</a:t>
+            </a:r>
+          </a:p>
+          <a:p>
+            <a:pPr lvl="1"/>
+            <a:r>
+              <a:rPr lang="de-DE" dirty="0" smtClean="0"/>
+              <a:t>Vergleichsoperatoren</a:t>
+            </a:r>
+          </a:p>
+          <a:p>
+            <a:pPr lvl="1"/>
+            <a:r>
+              <a:rPr lang="de-DE" smtClean="0"/>
+              <a:t>Verknüpfungen</a:t>
             </a:r>
             <a:endParaRPr lang="de-DE" dirty="0"/>
           </a:p>
@@ -13609,13 +13626,13 @@
   <p:clrMapOvr>
     <a:masterClrMapping/>
   </p:clrMapOvr>
-  <mc:AlternateContent xmlns:mc="http://schemas.openxmlformats.org/markup-compatibility/2006">
-    <mc:Choice xmlns:p14="http://schemas.microsoft.com/office/powerpoint/2010/main" Requires="p14">
+  <mc:AlternateContent xmlns:mc="http://schemas.openxmlformats.org/markup-compatibility/2006" xmlns:p14="http://schemas.microsoft.com/office/powerpoint/2010/main">
+    <mc:Choice Requires="p14">
       <p:transition spd="med" p14:dur="700">
         <p:fade/>
       </p:transition>
     </mc:Choice>
-    <mc:Fallback>
+    <mc:Fallback xmlns="">
       <p:transition spd="med">
         <p:fade/>
       </p:transition>
@@ -13706,13 +13723,13 @@
   <p:clrMapOvr>
     <a:masterClrMapping/>
   </p:clrMapOvr>
-  <mc:AlternateContent xmlns:mc="http://schemas.openxmlformats.org/markup-compatibility/2006">
-    <mc:Choice xmlns:p14="http://schemas.microsoft.com/office/powerpoint/2010/main" Requires="p14">
+  <mc:AlternateContent xmlns:mc="http://schemas.openxmlformats.org/markup-compatibility/2006" xmlns:p14="http://schemas.microsoft.com/office/powerpoint/2010/main">
+    <mc:Choice Requires="p14">
       <p:transition spd="med" p14:dur="700">
         <p:fade/>
       </p:transition>
     </mc:Choice>
-    <mc:Fallback>
+    <mc:Fallback xmlns="">
       <p:transition spd="med">
         <p:fade/>
       </p:transition>

</xml_diff>

<commit_message>
Added Arten to Variablen
</commit_message>
<xml_diff>
--- a/Variablen und Verzweigungen.pptx
+++ b/Variablen und Verzweigungen.pptx
@@ -13431,7 +13431,60 @@
               <a:rPr lang="de-DE" dirty="0" smtClean="0"/>
               <a:t>Arten</a:t>
             </a:r>
-            <a:endParaRPr lang="de-DE" dirty="0"/>
+          </a:p>
+          <a:p>
+            <a:pPr lvl="1"/>
+            <a:r>
+              <a:rPr lang="de-DE" dirty="0"/>
+              <a:t>i</a:t>
+            </a:r>
+            <a:r>
+              <a:rPr lang="de-DE" dirty="0" smtClean="0"/>
+              <a:t>nteger</a:t>
+            </a:r>
+          </a:p>
+          <a:p>
+            <a:pPr lvl="1"/>
+            <a:r>
+              <a:rPr lang="de-DE" dirty="0" err="1"/>
+              <a:t>f</a:t>
+            </a:r>
+            <a:r>
+              <a:rPr lang="de-DE" dirty="0" err="1" smtClean="0"/>
+              <a:t>loat</a:t>
+            </a:r>
+            <a:endParaRPr lang="de-DE" dirty="0" smtClean="0"/>
+          </a:p>
+          <a:p>
+            <a:pPr lvl="1"/>
+            <a:r>
+              <a:rPr lang="de-DE" dirty="0" smtClean="0"/>
+              <a:t>String</a:t>
+            </a:r>
+          </a:p>
+          <a:p>
+            <a:pPr lvl="1"/>
+            <a:r>
+              <a:rPr lang="de-DE" dirty="0" err="1"/>
+              <a:t>c</a:t>
+            </a:r>
+            <a:r>
+              <a:rPr lang="de-DE" dirty="0" err="1" smtClean="0"/>
+              <a:t>haracter</a:t>
+            </a:r>
+            <a:endParaRPr lang="de-DE" dirty="0" smtClean="0"/>
+          </a:p>
+          <a:p>
+            <a:pPr lvl="1"/>
+            <a:r>
+              <a:rPr lang="de-DE" dirty="0" err="1"/>
+              <a:t>b</a:t>
+            </a:r>
+            <a:r>
+              <a:rPr lang="de-DE" dirty="0" err="1" smtClean="0"/>
+              <a:t>oolean</a:t>
+            </a:r>
+            <a:endParaRPr lang="de-DE" dirty="0" smtClean="0"/>
           </a:p>
         </p:txBody>
       </p:sp>
@@ -13529,9 +13582,10 @@
           </a:p>
           <a:p>
             <a:r>
-              <a:rPr lang="de-DE" dirty="0" smtClean="0"/>
+              <a:rPr lang="de-DE" smtClean="0"/>
               <a:t>Arten</a:t>
             </a:r>
+            <a:endParaRPr lang="de-DE" dirty="0" smtClean="0"/>
           </a:p>
           <a:p>
             <a:r>
@@ -13549,7 +13603,7 @@
           <a:p>
             <a:pPr lvl="1"/>
             <a:r>
-              <a:rPr lang="de-DE" smtClean="0"/>
+              <a:rPr lang="de-DE" dirty="0" smtClean="0"/>
               <a:t>Verknüpfungen</a:t>
             </a:r>
             <a:endParaRPr lang="de-DE" dirty="0"/>

</xml_diff>